<commit_message>
[ADD] Tabella cuBLAS con confronti
</commit_message>
<xml_diff>
--- a/Documentazione/[MNI]_PresentazioneSeminario.pptx
+++ b/Documentazione/[MNI]_PresentazioneSeminario.pptx
@@ -280,7 +280,7 @@
           <a:p>
             <a:fld id="{5BB39080-8F44-46B6-B27F-2DEAA9A68D0D}" type="datetimeFigureOut">
               <a:rPr lang="it-IT" smtClean="0"/>
-              <a:t>10/12/2025</a:t>
+              <a:t>11/12/2025</a:t>
             </a:fld>
             <a:endParaRPr lang="it-IT"/>
           </a:p>
@@ -6260,7 +6260,7 @@
           <a:p>
             <a:fld id="{6E4C13E4-AE53-4D7F-831B-9D7C1470C077}" type="datetimeFigureOut">
               <a:rPr lang="it-IT" smtClean="0"/>
-              <a:t>10/12/2025</a:t>
+              <a:t>11/12/2025</a:t>
             </a:fld>
             <a:endParaRPr lang="it-IT"/>
           </a:p>
@@ -6458,7 +6458,7 @@
           <a:p>
             <a:fld id="{6E4C13E4-AE53-4D7F-831B-9D7C1470C077}" type="datetimeFigureOut">
               <a:rPr lang="it-IT" smtClean="0"/>
-              <a:t>10/12/2025</a:t>
+              <a:t>11/12/2025</a:t>
             </a:fld>
             <a:endParaRPr lang="it-IT"/>
           </a:p>
@@ -6666,7 +6666,7 @@
           <a:p>
             <a:fld id="{6E4C13E4-AE53-4D7F-831B-9D7C1470C077}" type="datetimeFigureOut">
               <a:rPr lang="it-IT" smtClean="0"/>
-              <a:t>10/12/2025</a:t>
+              <a:t>11/12/2025</a:t>
             </a:fld>
             <a:endParaRPr lang="it-IT"/>
           </a:p>
@@ -6864,7 +6864,7 @@
           <a:p>
             <a:fld id="{6E4C13E4-AE53-4D7F-831B-9D7C1470C077}" type="datetimeFigureOut">
               <a:rPr lang="it-IT" smtClean="0"/>
-              <a:t>10/12/2025</a:t>
+              <a:t>11/12/2025</a:t>
             </a:fld>
             <a:endParaRPr lang="it-IT"/>
           </a:p>
@@ -7139,7 +7139,7 @@
           <a:p>
             <a:fld id="{6E4C13E4-AE53-4D7F-831B-9D7C1470C077}" type="datetimeFigureOut">
               <a:rPr lang="it-IT" smtClean="0"/>
-              <a:t>10/12/2025</a:t>
+              <a:t>11/12/2025</a:t>
             </a:fld>
             <a:endParaRPr lang="it-IT"/>
           </a:p>
@@ -7404,7 +7404,7 @@
           <a:p>
             <a:fld id="{6E4C13E4-AE53-4D7F-831B-9D7C1470C077}" type="datetimeFigureOut">
               <a:rPr lang="it-IT" smtClean="0"/>
-              <a:t>10/12/2025</a:t>
+              <a:t>11/12/2025</a:t>
             </a:fld>
             <a:endParaRPr lang="it-IT"/>
           </a:p>
@@ -7816,7 +7816,7 @@
           <a:p>
             <a:fld id="{6E4C13E4-AE53-4D7F-831B-9D7C1470C077}" type="datetimeFigureOut">
               <a:rPr lang="it-IT" smtClean="0"/>
-              <a:t>10/12/2025</a:t>
+              <a:t>11/12/2025</a:t>
             </a:fld>
             <a:endParaRPr lang="it-IT"/>
           </a:p>
@@ -7957,7 +7957,7 @@
           <a:p>
             <a:fld id="{6E4C13E4-AE53-4D7F-831B-9D7C1470C077}" type="datetimeFigureOut">
               <a:rPr lang="it-IT" smtClean="0"/>
-              <a:t>10/12/2025</a:t>
+              <a:t>11/12/2025</a:t>
             </a:fld>
             <a:endParaRPr lang="it-IT"/>
           </a:p>
@@ -8070,7 +8070,7 @@
           <a:p>
             <a:fld id="{6E4C13E4-AE53-4D7F-831B-9D7C1470C077}" type="datetimeFigureOut">
               <a:rPr lang="it-IT" smtClean="0"/>
-              <a:t>10/12/2025</a:t>
+              <a:t>11/12/2025</a:t>
             </a:fld>
             <a:endParaRPr lang="it-IT"/>
           </a:p>
@@ -8381,7 +8381,7 @@
           <a:p>
             <a:fld id="{6E4C13E4-AE53-4D7F-831B-9D7C1470C077}" type="datetimeFigureOut">
               <a:rPr lang="it-IT" smtClean="0"/>
-              <a:t>10/12/2025</a:t>
+              <a:t>11/12/2025</a:t>
             </a:fld>
             <a:endParaRPr lang="it-IT"/>
           </a:p>
@@ -8669,7 +8669,7 @@
           <a:p>
             <a:fld id="{6E4C13E4-AE53-4D7F-831B-9D7C1470C077}" type="datetimeFigureOut">
               <a:rPr lang="it-IT" smtClean="0"/>
-              <a:t>10/12/2025</a:t>
+              <a:t>11/12/2025</a:t>
             </a:fld>
             <a:endParaRPr lang="it-IT"/>
           </a:p>
@@ -8910,7 +8910,7 @@
           <a:p>
             <a:fld id="{6E4C13E4-AE53-4D7F-831B-9D7C1470C077}" type="datetimeFigureOut">
               <a:rPr lang="it-IT" smtClean="0"/>
-              <a:t>10/12/2025</a:t>
+              <a:t>11/12/2025</a:t>
             </a:fld>
             <a:endParaRPr lang="it-IT"/>
           </a:p>
@@ -36356,8 +36356,8 @@
           </a:p>
         </p:txBody>
       </p:sp>
-      <mc:AlternateContent xmlns:mc="http://schemas.openxmlformats.org/markup-compatibility/2006">
-        <mc:Choice xmlns:a14="http://schemas.microsoft.com/office/drawing/2010/main" Requires="a14">
+      <mc:AlternateContent xmlns:mc="http://schemas.openxmlformats.org/markup-compatibility/2006" xmlns:a14="http://schemas.microsoft.com/office/drawing/2010/main">
+        <mc:Choice Requires="a14">
           <p:sp>
             <p:nvSpPr>
               <p:cNvPr id="4" name="Sottotitolo 2">
@@ -36742,7 +36742,7 @@
             </p:txBody>
           </p:sp>
         </mc:Choice>
-        <mc:Fallback>
+        <mc:Fallback xmlns="">
           <p:sp>
             <p:nvSpPr>
               <p:cNvPr id="4" name="Sottotitolo 2">
@@ -37826,8 +37826,8 @@
           </a:p>
         </p:txBody>
       </p:sp>
-      <mc:AlternateContent xmlns:mc="http://schemas.openxmlformats.org/markup-compatibility/2006">
-        <mc:Choice xmlns:a14="http://schemas.microsoft.com/office/drawing/2010/main" Requires="a14">
+      <mc:AlternateContent xmlns:mc="http://schemas.openxmlformats.org/markup-compatibility/2006" xmlns:a14="http://schemas.microsoft.com/office/drawing/2010/main">
+        <mc:Choice Requires="a14">
           <p:sp>
             <p:nvSpPr>
               <p:cNvPr id="4" name="Sottotitolo 2">
@@ -38212,7 +38212,7 @@
             </p:txBody>
           </p:sp>
         </mc:Choice>
-        <mc:Fallback>
+        <mc:Fallback xmlns="">
           <p:sp>
             <p:nvSpPr>
               <p:cNvPr id="4" name="Sottotitolo 2">
@@ -42896,8 +42896,8 @@
           </a:sp3d>
         </p:spPr>
       </p:pic>
-      <mc:AlternateContent xmlns:mc="http://schemas.openxmlformats.org/markup-compatibility/2006">
-        <mc:Choice xmlns:a14="http://schemas.microsoft.com/office/drawing/2010/main" Requires="a14">
+      <mc:AlternateContent xmlns:mc="http://schemas.openxmlformats.org/markup-compatibility/2006" xmlns:a14="http://schemas.microsoft.com/office/drawing/2010/main">
+        <mc:Choice Requires="a14">
           <p:sp>
             <p:nvSpPr>
               <p:cNvPr id="3" name="CasellaDiTesto 2">
@@ -42926,6 +42926,7 @@
               </a:bodyPr>
               <a:lstStyle/>
               <a:p>
+                <a:pPr/>
                 <a14:m>
                   <m:oMathPara xmlns:m="http://schemas.openxmlformats.org/officeDocument/2006/math">
                     <m:oMathParaPr>
@@ -42935,7 +42936,7 @@
                       <m:func>
                         <m:funcPr>
                           <m:ctrlPr>
-                            <a:rPr lang="en-US" sz="2800" i="0" smtClean="0">
+                            <a:rPr lang="en-US" sz="2800" i="1" smtClean="0">
                               <a:solidFill>
                                 <a:srgbClr val="FCFCFC"/>
                               </a:solidFill>
@@ -43309,7 +43310,7 @@
             </p:txBody>
           </p:sp>
         </mc:Choice>
-        <mc:Fallback>
+        <mc:Fallback xmlns="">
           <p:sp>
             <p:nvSpPr>
               <p:cNvPr id="3" name="CasellaDiTesto 2">

</xml_diff>

<commit_message>
[MOD] Correzione Errori Presentazione
</commit_message>
<xml_diff>
--- a/Documentazione/[MNI]_PresentazioneSeminario.pptx
+++ b/Documentazione/[MNI]_PresentazioneSeminario.pptx
@@ -280,7 +280,7 @@
           <a:p>
             <a:fld id="{5BB39080-8F44-46B6-B27F-2DEAA9A68D0D}" type="datetimeFigureOut">
               <a:rPr lang="it-IT" smtClean="0"/>
-              <a:t>11/12/2025</a:t>
+              <a:t>12/12/2025</a:t>
             </a:fld>
             <a:endParaRPr lang="it-IT"/>
           </a:p>
@@ -6260,7 +6260,7 @@
           <a:p>
             <a:fld id="{6E4C13E4-AE53-4D7F-831B-9D7C1470C077}" type="datetimeFigureOut">
               <a:rPr lang="it-IT" smtClean="0"/>
-              <a:t>11/12/2025</a:t>
+              <a:t>12/12/2025</a:t>
             </a:fld>
             <a:endParaRPr lang="it-IT"/>
           </a:p>
@@ -6458,7 +6458,7 @@
           <a:p>
             <a:fld id="{6E4C13E4-AE53-4D7F-831B-9D7C1470C077}" type="datetimeFigureOut">
               <a:rPr lang="it-IT" smtClean="0"/>
-              <a:t>11/12/2025</a:t>
+              <a:t>12/12/2025</a:t>
             </a:fld>
             <a:endParaRPr lang="it-IT"/>
           </a:p>
@@ -6666,7 +6666,7 @@
           <a:p>
             <a:fld id="{6E4C13E4-AE53-4D7F-831B-9D7C1470C077}" type="datetimeFigureOut">
               <a:rPr lang="it-IT" smtClean="0"/>
-              <a:t>11/12/2025</a:t>
+              <a:t>12/12/2025</a:t>
             </a:fld>
             <a:endParaRPr lang="it-IT"/>
           </a:p>
@@ -6864,7 +6864,7 @@
           <a:p>
             <a:fld id="{6E4C13E4-AE53-4D7F-831B-9D7C1470C077}" type="datetimeFigureOut">
               <a:rPr lang="it-IT" smtClean="0"/>
-              <a:t>11/12/2025</a:t>
+              <a:t>12/12/2025</a:t>
             </a:fld>
             <a:endParaRPr lang="it-IT"/>
           </a:p>
@@ -7139,7 +7139,7 @@
           <a:p>
             <a:fld id="{6E4C13E4-AE53-4D7F-831B-9D7C1470C077}" type="datetimeFigureOut">
               <a:rPr lang="it-IT" smtClean="0"/>
-              <a:t>11/12/2025</a:t>
+              <a:t>12/12/2025</a:t>
             </a:fld>
             <a:endParaRPr lang="it-IT"/>
           </a:p>
@@ -7404,7 +7404,7 @@
           <a:p>
             <a:fld id="{6E4C13E4-AE53-4D7F-831B-9D7C1470C077}" type="datetimeFigureOut">
               <a:rPr lang="it-IT" smtClean="0"/>
-              <a:t>11/12/2025</a:t>
+              <a:t>12/12/2025</a:t>
             </a:fld>
             <a:endParaRPr lang="it-IT"/>
           </a:p>
@@ -7816,7 +7816,7 @@
           <a:p>
             <a:fld id="{6E4C13E4-AE53-4D7F-831B-9D7C1470C077}" type="datetimeFigureOut">
               <a:rPr lang="it-IT" smtClean="0"/>
-              <a:t>11/12/2025</a:t>
+              <a:t>12/12/2025</a:t>
             </a:fld>
             <a:endParaRPr lang="it-IT"/>
           </a:p>
@@ -7957,7 +7957,7 @@
           <a:p>
             <a:fld id="{6E4C13E4-AE53-4D7F-831B-9D7C1470C077}" type="datetimeFigureOut">
               <a:rPr lang="it-IT" smtClean="0"/>
-              <a:t>11/12/2025</a:t>
+              <a:t>12/12/2025</a:t>
             </a:fld>
             <a:endParaRPr lang="it-IT"/>
           </a:p>
@@ -8070,7 +8070,7 @@
           <a:p>
             <a:fld id="{6E4C13E4-AE53-4D7F-831B-9D7C1470C077}" type="datetimeFigureOut">
               <a:rPr lang="it-IT" smtClean="0"/>
-              <a:t>11/12/2025</a:t>
+              <a:t>12/12/2025</a:t>
             </a:fld>
             <a:endParaRPr lang="it-IT"/>
           </a:p>
@@ -8381,7 +8381,7 @@
           <a:p>
             <a:fld id="{6E4C13E4-AE53-4D7F-831B-9D7C1470C077}" type="datetimeFigureOut">
               <a:rPr lang="it-IT" smtClean="0"/>
-              <a:t>11/12/2025</a:t>
+              <a:t>12/12/2025</a:t>
             </a:fld>
             <a:endParaRPr lang="it-IT"/>
           </a:p>
@@ -8669,7 +8669,7 @@
           <a:p>
             <a:fld id="{6E4C13E4-AE53-4D7F-831B-9D7C1470C077}" type="datetimeFigureOut">
               <a:rPr lang="it-IT" smtClean="0"/>
-              <a:t>11/12/2025</a:t>
+              <a:t>12/12/2025</a:t>
             </a:fld>
             <a:endParaRPr lang="it-IT"/>
           </a:p>
@@ -8910,7 +8910,7 @@
           <a:p>
             <a:fld id="{6E4C13E4-AE53-4D7F-831B-9D7C1470C077}" type="datetimeFigureOut">
               <a:rPr lang="it-IT" smtClean="0"/>
-              <a:t>11/12/2025</a:t>
+              <a:t>12/12/2025</a:t>
             </a:fld>
             <a:endParaRPr lang="it-IT"/>
           </a:p>
@@ -20892,7 +20892,7 @@
                 <a:ea typeface="Questrial" pitchFamily="2" charset="0"/>
                 <a:cs typeface="Questrial" pitchFamily="2" charset="0"/>
               </a:rPr>
-              <a:t>Usato nei sistemi distribuiti a larga scala</a:t>
+              <a:t>Usato nei sistemi distribuiti a larga scala.</a:t>
             </a:r>
           </a:p>
         </p:txBody>
@@ -25676,29 +25676,7 @@
                 <a:ea typeface="Questrial" pitchFamily="2" charset="0"/>
                 <a:cs typeface="Questrial" pitchFamily="2" charset="0"/>
               </a:rPr>
-              <a:t> di aggiornare gli stessi parametri senza lock </a:t>
-            </a:r>
-            <a:r>
-              <a:rPr lang="it-IT" sz="4000" dirty="0" err="1">
-                <a:solidFill>
-                  <a:srgbClr val="FCFCFC"/>
-                </a:solidFill>
-                <a:latin typeface="Questrial" pitchFamily="2" charset="0"/>
-                <a:ea typeface="Questrial" pitchFamily="2" charset="0"/>
-                <a:cs typeface="Questrial" pitchFamily="2" charset="0"/>
-              </a:rPr>
-              <a:t>epsliciti</a:t>
-            </a:r>
-            <a:r>
-              <a:rPr lang="it-IT" sz="4000" dirty="0">
-                <a:solidFill>
-                  <a:srgbClr val="FCFCFC"/>
-                </a:solidFill>
-                <a:latin typeface="Questrial" pitchFamily="2" charset="0"/>
-                <a:ea typeface="Questrial" pitchFamily="2" charset="0"/>
-                <a:cs typeface="Questrial" pitchFamily="2" charset="0"/>
-              </a:rPr>
-              <a:t>.</a:t>
+              <a:t> di aggiornare gli stessi parametri senza lock espliciti.</a:t>
             </a:r>
           </a:p>
         </p:txBody>

</xml_diff>